<commit_message>
updated to reflect changes of no ingredient dayplan js
</commit_message>
<xml_diff>
--- a/ESCULENT.pptx
+++ b/ESCULENT.pptx
@@ -206,7 +206,7 @@
           <a:p>
             <a:fld id="{8AA486E0-785D-467E-8DA1-3AE9122A56A2}" type="datetimeFigureOut">
               <a:rPr lang="en-US" smtClean="0"/>
-              <a:t>10/27/2020</a:t>
+              <a:t>10/28/2020</a:t>
             </a:fld>
             <a:endParaRPr lang="en-US"/>
           </a:p>
@@ -1122,7 +1122,7 @@
             </a:r>
             <a:r>
               <a:rPr lang="en-US" dirty="0" err="1"/>
-              <a:t>Ingredient_dayplan</a:t>
+              <a:t>Ingredient_result</a:t>
             </a:r>
             <a:r>
               <a:rPr lang="en-US" dirty="0"/>
@@ -1285,7 +1285,7 @@
             </a:r>
             <a:r>
               <a:rPr lang="en-US" dirty="0" err="1"/>
-              <a:t>Ingredient_dayplan</a:t>
+              <a:t>Ingredient_result</a:t>
             </a:r>
             <a:r>
               <a:rPr lang="en-US" dirty="0"/>
@@ -1491,7 +1491,7 @@
             </a:r>
             <a:r>
               <a:rPr lang="en-US" dirty="0" err="1"/>
-              <a:t>Ingredient_dayplan</a:t>
+              <a:t>Ingredient_result</a:t>
             </a:r>
             <a:r>
               <a:rPr lang="en-US" dirty="0"/>
@@ -1706,7 +1706,7 @@
           <a:p>
             <a:fld id="{2D062B8B-B32E-42A2-9F05-15E8C77FE3B4}" type="datetimeFigureOut">
               <a:rPr lang="en-US" smtClean="0"/>
-              <a:t>10/27/2020</a:t>
+              <a:t>10/28/2020</a:t>
             </a:fld>
             <a:endParaRPr lang="en-US"/>
           </a:p>
@@ -1904,7 +1904,7 @@
           <a:p>
             <a:fld id="{2D062B8B-B32E-42A2-9F05-15E8C77FE3B4}" type="datetimeFigureOut">
               <a:rPr lang="en-US" smtClean="0"/>
-              <a:t>10/27/2020</a:t>
+              <a:t>10/28/2020</a:t>
             </a:fld>
             <a:endParaRPr lang="en-US"/>
           </a:p>
@@ -2112,7 +2112,7 @@
           <a:p>
             <a:fld id="{2D062B8B-B32E-42A2-9F05-15E8C77FE3B4}" type="datetimeFigureOut">
               <a:rPr lang="en-US" smtClean="0"/>
-              <a:t>10/27/2020</a:t>
+              <a:t>10/28/2020</a:t>
             </a:fld>
             <a:endParaRPr lang="en-US"/>
           </a:p>
@@ -2310,7 +2310,7 @@
           <a:p>
             <a:fld id="{2D062B8B-B32E-42A2-9F05-15E8C77FE3B4}" type="datetimeFigureOut">
               <a:rPr lang="en-US" smtClean="0"/>
-              <a:t>10/27/2020</a:t>
+              <a:t>10/28/2020</a:t>
             </a:fld>
             <a:endParaRPr lang="en-US"/>
           </a:p>
@@ -2585,7 +2585,7 @@
           <a:p>
             <a:fld id="{2D062B8B-B32E-42A2-9F05-15E8C77FE3B4}" type="datetimeFigureOut">
               <a:rPr lang="en-US" smtClean="0"/>
-              <a:t>10/27/2020</a:t>
+              <a:t>10/28/2020</a:t>
             </a:fld>
             <a:endParaRPr lang="en-US"/>
           </a:p>
@@ -2850,7 +2850,7 @@
           <a:p>
             <a:fld id="{2D062B8B-B32E-42A2-9F05-15E8C77FE3B4}" type="datetimeFigureOut">
               <a:rPr lang="en-US" smtClean="0"/>
-              <a:t>10/27/2020</a:t>
+              <a:t>10/28/2020</a:t>
             </a:fld>
             <a:endParaRPr lang="en-US"/>
           </a:p>
@@ -3262,7 +3262,7 @@
           <a:p>
             <a:fld id="{2D062B8B-B32E-42A2-9F05-15E8C77FE3B4}" type="datetimeFigureOut">
               <a:rPr lang="en-US" smtClean="0"/>
-              <a:t>10/27/2020</a:t>
+              <a:t>10/28/2020</a:t>
             </a:fld>
             <a:endParaRPr lang="en-US"/>
           </a:p>
@@ -3403,7 +3403,7 @@
           <a:p>
             <a:fld id="{2D062B8B-B32E-42A2-9F05-15E8C77FE3B4}" type="datetimeFigureOut">
               <a:rPr lang="en-US" smtClean="0"/>
-              <a:t>10/27/2020</a:t>
+              <a:t>10/28/2020</a:t>
             </a:fld>
             <a:endParaRPr lang="en-US"/>
           </a:p>
@@ -3516,7 +3516,7 @@
           <a:p>
             <a:fld id="{2D062B8B-B32E-42A2-9F05-15E8C77FE3B4}" type="datetimeFigureOut">
               <a:rPr lang="en-US" smtClean="0"/>
-              <a:t>10/27/2020</a:t>
+              <a:t>10/28/2020</a:t>
             </a:fld>
             <a:endParaRPr lang="en-US"/>
           </a:p>
@@ -3827,7 +3827,7 @@
           <a:p>
             <a:fld id="{2D062B8B-B32E-42A2-9F05-15E8C77FE3B4}" type="datetimeFigureOut">
               <a:rPr lang="en-US" smtClean="0"/>
-              <a:t>10/27/2020</a:t>
+              <a:t>10/28/2020</a:t>
             </a:fld>
             <a:endParaRPr lang="en-US"/>
           </a:p>
@@ -4115,7 +4115,7 @@
           <a:p>
             <a:fld id="{2D062B8B-B32E-42A2-9F05-15E8C77FE3B4}" type="datetimeFigureOut">
               <a:rPr lang="en-US" smtClean="0"/>
-              <a:t>10/27/2020</a:t>
+              <a:t>10/28/2020</a:t>
             </a:fld>
             <a:endParaRPr lang="en-US"/>
           </a:p>
@@ -4356,7 +4356,7 @@
           <a:p>
             <a:fld id="{2D062B8B-B32E-42A2-9F05-15E8C77FE3B4}" type="datetimeFigureOut">
               <a:rPr lang="en-US" smtClean="0"/>
-              <a:t>10/27/2020</a:t>
+              <a:t>10/28/2020</a:t>
             </a:fld>
             <a:endParaRPr lang="en-US"/>
           </a:p>
@@ -5239,7 +5239,7 @@
             <a:pPr algn="ctr"/>
             <a:r>
               <a:rPr lang="en-US" dirty="0" err="1"/>
-              <a:t>Ingredient_dayplan</a:t>
+              <a:t>Ingredient_result</a:t>
             </a:r>
             <a:endParaRPr lang="en-US" dirty="0"/>
           </a:p>
@@ -8836,7 +8836,7 @@
             <a:pPr algn="ctr"/>
             <a:r>
               <a:rPr lang="en-US" dirty="0" err="1"/>
-              <a:t>Ingredient_dayplan</a:t>
+              <a:t>Ingredient_result</a:t>
             </a:r>
             <a:endParaRPr lang="en-US" dirty="0"/>
           </a:p>
@@ -9121,9 +9121,12 @@
             <a:pPr algn="ctr"/>
             <a:r>
               <a:rPr lang="en-US" dirty="0" err="1"/>
-              <a:t>Ingredient_dayplan</a:t>
-            </a:r>
-            <a:endParaRPr lang="en-US" dirty="0"/>
+              <a:t>Ingredient_Result</a:t>
+            </a:r>
+            <a:r>
+              <a:rPr lang="en-US" dirty="0"/>
+              <a:t> </a:t>
+            </a:r>
           </a:p>
           <a:p>
             <a:pPr algn="ctr"/>

</xml_diff>